<commit_message>
chore: derniers retour powerpoint
</commit_message>
<xml_diff>
--- a/public/ppt/template.pptx
+++ b/public/ppt/template.pptx
@@ -15916,7 +15916,7 @@
           <p:nvPr>
             <p:extLst>
               <p:ext uri="{D42A27DB-BD31-4B8C-83A1-F6EECF244321}">
-                <p14:modId xmlns:p14="http://schemas.microsoft.com/office/powerpoint/2010/main" val="3419572948"/>
+                <p14:modId xmlns:p14="http://schemas.microsoft.com/office/powerpoint/2010/main" val="1575238142"/>
               </p:ext>
             </p:extLst>
           </p:nvPr>
@@ -17543,7 +17543,7 @@
                             <a:schemeClr val="dk1"/>
                           </a:solidFill>
                         </a:rPr>
-                        <a:t>{{vacance1}}% </a:t>
+                        <a:t>{{vacance1}} </a:t>
                       </a:r>
                       <a:endParaRPr sz="1100" i="1" dirty="0"/>
                     </a:p>
@@ -17614,7 +17614,7 @@
                             <a:schemeClr val="dk1"/>
                           </a:solidFill>
                         </a:rPr>
-                        <a:t>{{vacance2}}% </a:t>
+                        <a:t>{{vacance2}} </a:t>
                       </a:r>
                       <a:endParaRPr sz="1100" i="1" dirty="0"/>
                     </a:p>
@@ -17684,7 +17684,11 @@
                       </a:pPr>
                       <a:r>
                         <a:rPr lang="en-US" sz="1100" i="1" dirty="0"/>
-                        <a:t>{{vacance3}}%</a:t>
+                        <a:t>{{</a:t>
+                      </a:r>
+                      <a:r>
+                        <a:rPr lang="en-US" sz="1100" i="1"/>
+                        <a:t>vacance3}}</a:t>
                       </a:r>
                       <a:endParaRPr sz="1100" i="1" dirty="0"/>
                     </a:p>

</xml_diff>